<commit_message>
updated class 1 PPT
</commit_message>
<xml_diff>
--- a/PPTs/Class 1.pptx
+++ b/PPTs/Class 1.pptx
@@ -323,7 +323,7 @@
             <a:fld id="{F417509E-4BD3-494B-9309-53CF9A45C23B}" type="datetimeFigureOut">
               <a:rPr lang="en-US" smtClean="0"/>
               <a:pPr/>
-              <a:t>30-Apr-24</a:t>
+              <a:t>02-May-24</a:t>
             </a:fld>
             <a:endParaRPr lang="en-US"/>
           </a:p>
@@ -488,7 +488,7 @@
             <a:fld id="{F417509E-4BD3-494B-9309-53CF9A45C23B}" type="datetimeFigureOut">
               <a:rPr lang="en-US" smtClean="0"/>
               <a:pPr/>
-              <a:t>30-Apr-24</a:t>
+              <a:t>02-May-24</a:t>
             </a:fld>
             <a:endParaRPr lang="en-US"/>
           </a:p>
@@ -663,7 +663,7 @@
             <a:fld id="{F417509E-4BD3-494B-9309-53CF9A45C23B}" type="datetimeFigureOut">
               <a:rPr lang="en-US" smtClean="0"/>
               <a:pPr/>
-              <a:t>30-Apr-24</a:t>
+              <a:t>02-May-24</a:t>
             </a:fld>
             <a:endParaRPr lang="en-US"/>
           </a:p>
@@ -828,7 +828,7 @@
             <a:fld id="{F417509E-4BD3-494B-9309-53CF9A45C23B}" type="datetimeFigureOut">
               <a:rPr lang="en-US" smtClean="0"/>
               <a:pPr/>
-              <a:t>30-Apr-24</a:t>
+              <a:t>02-May-24</a:t>
             </a:fld>
             <a:endParaRPr lang="en-US"/>
           </a:p>
@@ -1070,7 +1070,7 @@
             <a:fld id="{F417509E-4BD3-494B-9309-53CF9A45C23B}" type="datetimeFigureOut">
               <a:rPr lang="en-US" smtClean="0"/>
               <a:pPr/>
-              <a:t>30-Apr-24</a:t>
+              <a:t>02-May-24</a:t>
             </a:fld>
             <a:endParaRPr lang="en-US"/>
           </a:p>
@@ -1352,7 +1352,7 @@
             <a:fld id="{F417509E-4BD3-494B-9309-53CF9A45C23B}" type="datetimeFigureOut">
               <a:rPr lang="en-US" smtClean="0"/>
               <a:pPr/>
-              <a:t>30-Apr-24</a:t>
+              <a:t>02-May-24</a:t>
             </a:fld>
             <a:endParaRPr lang="en-US"/>
           </a:p>
@@ -1768,7 +1768,7 @@
             <a:fld id="{F417509E-4BD3-494B-9309-53CF9A45C23B}" type="datetimeFigureOut">
               <a:rPr lang="en-US" smtClean="0"/>
               <a:pPr/>
-              <a:t>30-Apr-24</a:t>
+              <a:t>02-May-24</a:t>
             </a:fld>
             <a:endParaRPr lang="en-US"/>
           </a:p>
@@ -1882,7 +1882,7 @@
             <a:fld id="{F417509E-4BD3-494B-9309-53CF9A45C23B}" type="datetimeFigureOut">
               <a:rPr lang="en-US" smtClean="0"/>
               <a:pPr/>
-              <a:t>30-Apr-24</a:t>
+              <a:t>02-May-24</a:t>
             </a:fld>
             <a:endParaRPr lang="en-US"/>
           </a:p>
@@ -1974,7 +1974,7 @@
             <a:fld id="{F417509E-4BD3-494B-9309-53CF9A45C23B}" type="datetimeFigureOut">
               <a:rPr lang="en-US" smtClean="0"/>
               <a:pPr/>
-              <a:t>30-Apr-24</a:t>
+              <a:t>02-May-24</a:t>
             </a:fld>
             <a:endParaRPr lang="en-US"/>
           </a:p>
@@ -2246,7 +2246,7 @@
             <a:fld id="{F417509E-4BD3-494B-9309-53CF9A45C23B}" type="datetimeFigureOut">
               <a:rPr lang="en-US" smtClean="0"/>
               <a:pPr/>
-              <a:t>30-Apr-24</a:t>
+              <a:t>02-May-24</a:t>
             </a:fld>
             <a:endParaRPr lang="en-US"/>
           </a:p>
@@ -2495,7 +2495,7 @@
             <a:fld id="{F417509E-4BD3-494B-9309-53CF9A45C23B}" type="datetimeFigureOut">
               <a:rPr lang="en-US" smtClean="0"/>
               <a:pPr/>
-              <a:t>30-Apr-24</a:t>
+              <a:t>02-May-24</a:t>
             </a:fld>
             <a:endParaRPr lang="en-US"/>
           </a:p>
@@ -2703,7 +2703,7 @@
             <a:fld id="{F417509E-4BD3-494B-9309-53CF9A45C23B}" type="datetimeFigureOut">
               <a:rPr lang="en-US" smtClean="0"/>
               <a:pPr/>
-              <a:t>30-Apr-24</a:t>
+              <a:t>02-May-24</a:t>
             </a:fld>
             <a:endParaRPr lang="en-US"/>
           </a:p>
@@ -3108,7 +3108,10 @@
               <a:rPr lang="en-US" dirty="0" err="1"/>
               <a:t>JnanaMarga</a:t>
             </a:r>
-            <a:endParaRPr lang="en-US" dirty="0"/>
+            <a:r>
+              <a:rPr lang="en-US" dirty="0"/>
+              <a:t> Internship Program</a:t>
+            </a:r>
           </a:p>
         </p:txBody>
       </p:sp>
@@ -3128,12 +3131,105 @@
             <p:ph type="subTitle" idx="1"/>
           </p:nvPr>
         </p:nvSpPr>
-        <p:spPr/>
+        <p:spPr>
+          <a:xfrm>
+            <a:off x="1170495" y="1600200"/>
+            <a:ext cx="7315200" cy="762000"/>
+          </a:xfrm>
+        </p:spPr>
         <p:txBody>
           <a:bodyPr/>
           <a:lstStyle/>
           <a:p>
-            <a:endParaRPr lang="en-US"/>
+            <a:r>
+              <a:rPr lang="en-US" dirty="0"/>
+              <a:t>Few Things to keep in mind</a:t>
+            </a:r>
+          </a:p>
+          <a:p>
+            <a:endParaRPr lang="en-US" dirty="0"/>
+          </a:p>
+          <a:p>
+            <a:endParaRPr lang="en-US" dirty="0"/>
+          </a:p>
+        </p:txBody>
+      </p:sp>
+      <p:sp>
+        <p:nvSpPr>
+          <p:cNvPr id="4" name="TextBox 3">
+            <a:extLst>
+              <a:ext uri="{FF2B5EF4-FFF2-40B4-BE49-F238E27FC236}">
+                <a16:creationId xmlns:a16="http://schemas.microsoft.com/office/drawing/2014/main" id="{BAA3DF3B-DE86-CB0F-CE9E-0414E600930A}"/>
+              </a:ext>
+            </a:extLst>
+          </p:cNvPr>
+          <p:cNvSpPr txBox="1"/>
+          <p:nvPr/>
+        </p:nvSpPr>
+        <p:spPr>
+          <a:xfrm>
+            <a:off x="685800" y="2971800"/>
+            <a:ext cx="8229600" cy="2246769"/>
+          </a:xfrm>
+          <a:prstGeom prst="rect">
+            <a:avLst/>
+          </a:prstGeom>
+          <a:noFill/>
+        </p:spPr>
+        <p:txBody>
+          <a:bodyPr wrap="square" rtlCol="0">
+            <a:spAutoFit/>
+          </a:bodyPr>
+          <a:lstStyle/>
+          <a:p>
+            <a:pPr marL="457200" indent="-457200">
+              <a:buFont typeface="Arial" panose="020B0604020202020204" pitchFamily="34" charset="0"/>
+              <a:buChar char="•"/>
+            </a:pPr>
+            <a:r>
+              <a:rPr lang="en-US" sz="2800" dirty="0"/>
+              <a:t>Have a Learning attitude</a:t>
+            </a:r>
+          </a:p>
+          <a:p>
+            <a:pPr marL="457200" indent="-457200">
+              <a:buFont typeface="Arial" panose="020B0604020202020204" pitchFamily="34" charset="0"/>
+              <a:buChar char="•"/>
+            </a:pPr>
+            <a:r>
+              <a:rPr lang="en-US" sz="2800" dirty="0"/>
+              <a:t>Communicate your problems and difficulties</a:t>
+            </a:r>
+          </a:p>
+          <a:p>
+            <a:pPr marL="457200" indent="-457200">
+              <a:buFont typeface="Arial" panose="020B0604020202020204" pitchFamily="34" charset="0"/>
+              <a:buChar char="•"/>
+            </a:pPr>
+            <a:r>
+              <a:rPr lang="en-US" sz="2800" dirty="0"/>
+              <a:t>Help each other</a:t>
+            </a:r>
+          </a:p>
+          <a:p>
+            <a:pPr marL="457200" indent="-457200">
+              <a:buFont typeface="Arial" panose="020B0604020202020204" pitchFamily="34" charset="0"/>
+              <a:buChar char="•"/>
+            </a:pPr>
+            <a:r>
+              <a:rPr lang="en-US" sz="2800" dirty="0"/>
+              <a:t>While Learning something new do not use AI</a:t>
+            </a:r>
+          </a:p>
+          <a:p>
+            <a:pPr marL="457200" indent="-457200">
+              <a:buFont typeface="Arial" panose="020B0604020202020204" pitchFamily="34" charset="0"/>
+              <a:buChar char="•"/>
+            </a:pPr>
+            <a:r>
+              <a:rPr lang="en-US" sz="2800" dirty="0"/>
+              <a:t>Google is your best friend!!</a:t>
+            </a:r>
           </a:p>
         </p:txBody>
       </p:sp>

</xml_diff>